<commit_message>
testing and modifying whole pipeline
resampling of all parcellations
main.sh restored and almost finished
segmentation tested for geod
in test now for con+adj
sensor_model.sh restored in the workflow
resamp-anat.sh split in resamp-surf.sh and resamp-annot.sh
</commit_message>
<xml_diff>
--- a/docs/overviewDiagram.pptx
+++ b/docs/overviewDiagram.pptx
@@ -4636,8 +4636,8 @@
         </p:nvSpPr>
         <p:spPr>
           <a:xfrm>
-            <a:off x="2948544" y="6858986"/>
-            <a:ext cx="1765083" cy="400738"/>
+            <a:off x="2948544" y="6761050"/>
+            <a:ext cx="1765083" cy="498674"/>
           </a:xfrm>
           <a:prstGeom prst="ellipse">
             <a:avLst/>
@@ -4734,7 +4734,7 @@
         <p:spPr>
           <a:xfrm flipH="1">
             <a:off x="3831086" y="5097711"/>
-            <a:ext cx="7352" cy="1761275"/>
+            <a:ext cx="7352" cy="1663339"/>
           </a:xfrm>
           <a:prstGeom prst="straightConnector1">
             <a:avLst/>
@@ -8187,7 +8187,7 @@
         </p:nvSpPr>
         <p:spPr>
           <a:xfrm>
-            <a:off x="4453740" y="6499371"/>
+            <a:off x="4466029" y="6430282"/>
             <a:ext cx="2328974" cy="504815"/>
           </a:xfrm>
           <a:prstGeom prst="ellipse">
@@ -8287,8 +8287,8 @@
         </p:nvCxnSpPr>
         <p:spPr>
           <a:xfrm flipH="1">
-            <a:off x="5618227" y="6255536"/>
-            <a:ext cx="339954" cy="243835"/>
+            <a:off x="5630516" y="6255536"/>
+            <a:ext cx="327665" cy="174746"/>
           </a:xfrm>
           <a:prstGeom prst="straightConnector1">
             <a:avLst/>
@@ -8416,8 +8416,8 @@
         </p:nvCxnSpPr>
         <p:spPr>
           <a:xfrm>
-            <a:off x="5618227" y="7004186"/>
-            <a:ext cx="482098" cy="243835"/>
+            <a:off x="5630516" y="6935097"/>
+            <a:ext cx="469809" cy="312924"/>
           </a:xfrm>
           <a:prstGeom prst="straightConnector1">
             <a:avLst/>

</xml_diff>